<commit_message>
Added visualizations to the powerpoint
</commit_message>
<xml_diff>
--- a/avi_accidents_presentation.pptx
+++ b/avi_accidents_presentation.pptx
@@ -109,6 +109,11 @@
       </a:defRPr>
     </a:lvl9pPr>
   </p:defaultTextStyle>
+  <p:extLst>
+    <p:ext uri="{EFAFB233-063F-42B5-8137-9DF3F51BA10A}">
+      <p15:sldGuideLst xmlns:p15="http://schemas.microsoft.com/office/powerpoint/2012/main"/>
+    </p:ext>
+  </p:extLst>
 </p:presentation>
 </file>
 
@@ -3537,35 +3542,48 @@
           <a:bodyPr/>
           <a:lstStyle/>
           <a:p>
-            <a:endParaRPr lang="en-US"/>
-          </a:p>
-        </p:txBody>
-      </p:sp>
-      <p:sp>
-        <p:nvSpPr>
-          <p:cNvPr id="3" name="Content Placeholder 2">
-            <a:extLst>
-              <a:ext uri="{FF2B5EF4-FFF2-40B4-BE49-F238E27FC236}">
-                <a16:creationId xmlns:a16="http://schemas.microsoft.com/office/drawing/2014/main" id="{3F3CD2DA-C44B-7DD2-3F9E-7AB9A2DE166B}"/>
-              </a:ext>
-            </a:extLst>
-          </p:cNvPr>
-          <p:cNvSpPr>
-            <a:spLocks noGrp="1"/>
-          </p:cNvSpPr>
+            <a:r>
+              <a:rPr lang="en-US" dirty="0"/>
+              <a:t>Aircraft types with lowest number of accidents</a:t>
+            </a:r>
+          </a:p>
+        </p:txBody>
+      </p:sp>
+      <p:pic>
+        <p:nvPicPr>
+          <p:cNvPr id="9" name="Content Placeholder 8">
+            <a:extLst>
+              <a:ext uri="{FF2B5EF4-FFF2-40B4-BE49-F238E27FC236}">
+                <a16:creationId xmlns:a16="http://schemas.microsoft.com/office/drawing/2014/main" id="{74FD294D-FBDE-CDE2-888E-BF0B89101E70}"/>
+              </a:ext>
+            </a:extLst>
+          </p:cNvPr>
+          <p:cNvPicPr>
+            <a:picLocks noGrp="1" noChangeAspect="1"/>
+          </p:cNvPicPr>
           <p:nvPr>
             <p:ph idx="1"/>
           </p:nvPr>
-        </p:nvSpPr>
-        <p:spPr/>
-        <p:txBody>
-          <a:bodyPr/>
-          <a:lstStyle/>
-          <a:p>
-            <a:endParaRPr lang="en-US"/>
-          </a:p>
-        </p:txBody>
-      </p:sp>
+        </p:nvPicPr>
+        <p:blipFill>
+          <a:blip r:embed="rId2">
+            <a:extLst>
+              <a:ext uri="{28A0092B-C50C-407E-A947-70E740481C1C}">
+                <a14:useLocalDpi xmlns:a14="http://schemas.microsoft.com/office/drawing/2010/main" val="0"/>
+              </a:ext>
+            </a:extLst>
+          </a:blip>
+          <a:stretch>
+            <a:fillRect/>
+          </a:stretch>
+        </p:blipFill>
+        <p:spPr>
+          <a:xfrm>
+            <a:off x="2577919" y="1962839"/>
+            <a:ext cx="7036162" cy="4076910"/>
+          </a:xfrm>
+        </p:spPr>
+      </p:pic>
     </p:spTree>
     <p:extLst>
       <p:ext uri="{BB962C8B-B14F-4D97-AF65-F5344CB8AC3E}">
@@ -3617,35 +3635,48 @@
           <a:bodyPr/>
           <a:lstStyle/>
           <a:p>
-            <a:endParaRPr lang="en-US"/>
-          </a:p>
-        </p:txBody>
-      </p:sp>
-      <p:sp>
-        <p:nvSpPr>
-          <p:cNvPr id="3" name="Content Placeholder 2">
-            <a:extLst>
-              <a:ext uri="{FF2B5EF4-FFF2-40B4-BE49-F238E27FC236}">
-                <a16:creationId xmlns:a16="http://schemas.microsoft.com/office/drawing/2014/main" id="{94C7A710-97C1-C22A-1238-FC40F91521E4}"/>
-              </a:ext>
-            </a:extLst>
-          </p:cNvPr>
-          <p:cNvSpPr>
-            <a:spLocks noGrp="1"/>
-          </p:cNvSpPr>
+            <a:r>
+              <a:rPr lang="en-US" dirty="0"/>
+              <a:t>Map of accidents per country</a:t>
+            </a:r>
+          </a:p>
+        </p:txBody>
+      </p:sp>
+      <p:pic>
+        <p:nvPicPr>
+          <p:cNvPr id="13" name="Content Placeholder 12">
+            <a:extLst>
+              <a:ext uri="{FF2B5EF4-FFF2-40B4-BE49-F238E27FC236}">
+                <a16:creationId xmlns:a16="http://schemas.microsoft.com/office/drawing/2014/main" id="{14E5806F-91DE-401D-E9F9-2DF1B29B7064}"/>
+              </a:ext>
+            </a:extLst>
+          </p:cNvPr>
+          <p:cNvPicPr>
+            <a:picLocks noGrp="1" noChangeAspect="1"/>
+          </p:cNvPicPr>
           <p:nvPr>
             <p:ph idx="1"/>
           </p:nvPr>
-        </p:nvSpPr>
-        <p:spPr/>
-        <p:txBody>
-          <a:bodyPr/>
-          <a:lstStyle/>
-          <a:p>
-            <a:endParaRPr lang="en-US"/>
-          </a:p>
-        </p:txBody>
-      </p:sp>
+        </p:nvPicPr>
+        <p:blipFill>
+          <a:blip r:embed="rId2">
+            <a:extLst>
+              <a:ext uri="{28A0092B-C50C-407E-A947-70E740481C1C}">
+                <a14:useLocalDpi xmlns:a14="http://schemas.microsoft.com/office/drawing/2010/main" val="0"/>
+              </a:ext>
+            </a:extLst>
+          </a:blip>
+          <a:stretch>
+            <a:fillRect/>
+          </a:stretch>
+        </p:blipFill>
+        <p:spPr>
+          <a:xfrm>
+            <a:off x="2825582" y="2143823"/>
+            <a:ext cx="6540836" cy="3714941"/>
+          </a:xfrm>
+        </p:spPr>
+      </p:pic>
     </p:spTree>
     <p:extLst>
       <p:ext uri="{BB962C8B-B14F-4D97-AF65-F5344CB8AC3E}">
@@ -3947,8 +3978,12 @@
           <a:lstStyle/>
           <a:p>
             <a:r>
+              <a:rPr lang="en-US"/>
+              <a:t>3- The </a:t>
+            </a:r>
+            <a:r>
               <a:rPr lang="en-US" dirty="0"/>
-              <a:t>The most common type of accident is the A1, which means the accident had a high fatality rate(the data shows most fatalities are in this category). This means the company has to </a:t>
+              <a:t>most common type of accident is the A1, which means the accident had a high fatality rate(the data shows most fatalities are in this category). This means the company has to </a:t>
             </a:r>
             <a:r>
               <a:rPr lang="en-US" dirty="0" err="1"/>

</xml_diff>